<commit_message>
[Quynh] Update file report & slide
</commit_message>
<xml_diff>
--- a/documents/Slide.pptx
+++ b/documents/Slide.pptx
@@ -4727,7 +4727,13 @@
               <a:rPr lang="en-US" altLang="ko-KR" sz="3600" dirty="0">
                 <a:ea typeface="맑은 고딕" pitchFamily="50" charset="-127"/>
               </a:rPr>
-              <a:t>LEGEND OF WORLD</a:t>
+              <a:t>LEGEND OF </a:t>
+            </a:r>
+            <a:r>
+              <a:rPr lang="en-US" altLang="ko-KR" dirty="0">
+                <a:ea typeface="맑은 고딕" pitchFamily="50" charset="-127"/>
+              </a:rPr>
+              <a:t>PIRATE</a:t>
             </a:r>
             <a:endParaRPr lang="en-US" altLang="ko-KR" sz="3600" dirty="0"/>
           </a:p>
@@ -4756,53 +4762,11 @@
             </a:pPr>
             <a:r>
               <a:rPr lang="en-US" altLang="ko-KR" sz="1200" dirty="0"/>
-              <a:t>2D RPG MOBILE GAME – USING COCOS2D-X ENGINE</a:t>
+              <a:t>2D HYPER CASUAL GAME – USING UNITY3D ENGINE</a:t>
             </a:r>
           </a:p>
         </p:txBody>
       </p:sp>
-      <p:pic>
-        <p:nvPicPr>
-          <p:cNvPr id="8" name="Hình ảnh 7" descr="Ảnh có chứa màn hình, thiết bị điện tử, điện thoại, đang ngồi&#10;&#10;Mô tả được tạo tự động">
-            <a:extLst>
-              <a:ext uri="{FF2B5EF4-FFF2-40B4-BE49-F238E27FC236}">
-                <a16:creationId xmlns:a16="http://schemas.microsoft.com/office/drawing/2014/main" id="{C24F0DF1-D20A-49FE-A370-4826FB1D7AB8}"/>
-              </a:ext>
-            </a:extLst>
-          </p:cNvPr>
-          <p:cNvPicPr>
-            <a:picLocks noChangeAspect="1"/>
-          </p:cNvPicPr>
-          <p:nvPr/>
-        </p:nvPicPr>
-        <p:blipFill>
-          <a:blip r:embed="rId2">
-            <a:extLst>
-              <a:ext uri="{28A0092B-C50C-407E-A947-70E740481C1C}">
-                <a14:useLocalDpi xmlns:a14="http://schemas.microsoft.com/office/drawing/2010/main" val="0"/>
-              </a:ext>
-            </a:extLst>
-          </a:blip>
-          <a:stretch>
-            <a:fillRect/>
-          </a:stretch>
-        </p:blipFill>
-        <p:spPr>
-          <a:xfrm>
-            <a:off x="1043608" y="0"/>
-            <a:ext cx="6804248" cy="3753311"/>
-          </a:xfrm>
-          <a:prstGeom prst="rect">
-            <a:avLst/>
-          </a:prstGeom>
-          <a:ln>
-            <a:noFill/>
-          </a:ln>
-          <a:effectLst>
-            <a:softEdge rad="112500"/>
-          </a:effectLst>
-        </p:spPr>
-      </p:pic>
       <p:sp>
         <p:nvSpPr>
           <p:cNvPr id="9" name="Text Placeholder 3">
@@ -5032,6 +4996,14 @@
             </a:r>
             <a:r>
               <a:rPr lang="en-US" altLang="ko-KR" sz="1200" dirty="0" err="1"/>
+              <a:t>Hà</a:t>
+            </a:r>
+            <a:r>
+              <a:rPr lang="en-US" altLang="ko-KR" sz="1200" dirty="0"/>
+              <a:t> Nguyễn </a:t>
+            </a:r>
+            <a:r>
+              <a:rPr lang="en-US" altLang="ko-KR" sz="1200" dirty="0" err="1"/>
               <a:t>Hoàng</a:t>
             </a:r>
             <a:r>
@@ -5044,7 +5016,31 @@
             </a:r>
             <a:r>
               <a:rPr lang="en-US" altLang="ko-KR" sz="1200" dirty="0"/>
-              <a:t>( GD17) &amp; Nguyễn </a:t>
+              <a:t>, </a:t>
+            </a:r>
+            <a:r>
+              <a:rPr lang="en-US" altLang="ko-KR" sz="1200" dirty="0" err="1"/>
+              <a:t>Huỳnh</a:t>
+            </a:r>
+            <a:r>
+              <a:rPr lang="en-US" altLang="ko-KR" sz="1200" dirty="0"/>
+              <a:t> </a:t>
+            </a:r>
+            <a:r>
+              <a:rPr lang="en-US" altLang="ko-KR" sz="1200" dirty="0" err="1"/>
+              <a:t>Thiện</a:t>
+            </a:r>
+            <a:r>
+              <a:rPr lang="en-US" altLang="ko-KR" sz="1200" dirty="0"/>
+              <a:t> </a:t>
+            </a:r>
+            <a:r>
+              <a:rPr lang="en-US" altLang="ko-KR" sz="1200" dirty="0" err="1"/>
+              <a:t>Hữu</a:t>
+            </a:r>
+            <a:r>
+              <a:rPr lang="en-US" altLang="ko-KR" sz="1200" dirty="0"/>
+              <a:t> &amp; Nguyễn </a:t>
             </a:r>
             <a:r>
               <a:rPr lang="en-US" altLang="ko-KR" sz="1200" dirty="0" err="1"/>
@@ -5052,7 +5048,7 @@
             </a:r>
             <a:r>
               <a:rPr lang="en-US" altLang="ko-KR" sz="1200" dirty="0"/>
-              <a:t> Quỳnh( GD18)</a:t>
+              <a:t> Quỳnh</a:t>
             </a:r>
           </a:p>
         </p:txBody>
@@ -7347,7 +7343,7 @@
                   </a:solidFill>
                   <a:cs typeface="Arial" pitchFamily="34" charset="0"/>
                 </a:rPr>
-                <a:t>MOBILE</a:t>
+                <a:t>MULTI-PLATFORM</a:t>
               </a:r>
             </a:p>
             <a:p>
@@ -7361,7 +7357,7 @@
                   </a:solidFill>
                   <a:cs typeface="Arial" pitchFamily="34" charset="0"/>
                 </a:rPr>
-                <a:t>RPG GAME</a:t>
+                <a:t>HYPER-CASUAL</a:t>
               </a:r>
             </a:p>
           </p:txBody>
@@ -7507,7 +7503,7 @@
                   </a:solidFill>
                   <a:cs typeface="Arial" pitchFamily="34" charset="0"/>
                 </a:rPr>
-                <a:t>TIÊU DIỆT QUÁI VẬT</a:t>
+                <a:t>BẮN KIM CƯƠNG</a:t>
               </a:r>
             </a:p>
             <a:p>
@@ -7521,7 +7517,7 @@
                   </a:solidFill>
                   <a:cs typeface="Arial" pitchFamily="34" charset="0"/>
                 </a:rPr>
-                <a:t>SỬ DỤNG KỸ NĂNG</a:t>
+                <a:t>OPEN WORLD</a:t>
               </a:r>
               <a:endParaRPr lang="ko-KR" altLang="en-US" sz="1600" dirty="0">
                 <a:solidFill>
@@ -7611,10 +7607,10 @@
         </p:nvGrpSpPr>
         <p:grpSpPr>
           <a:xfrm>
-            <a:off x="5653580" y="1421443"/>
-            <a:ext cx="2934143" cy="1000274"/>
-            <a:chOff x="1446245" y="1535269"/>
-            <a:chExt cx="3031457" cy="1000274"/>
+            <a:off x="5652252" y="884287"/>
+            <a:ext cx="2934143" cy="2491368"/>
+            <a:chOff x="1444873" y="1364048"/>
+            <a:chExt cx="3031457" cy="1376838"/>
           </a:xfrm>
         </p:grpSpPr>
         <p:sp>
@@ -7625,8 +7621,8 @@
           </p:nvSpPr>
           <p:spPr>
             <a:xfrm>
-              <a:off x="1446245" y="2196989"/>
-              <a:ext cx="3023679" cy="338554"/>
+              <a:off x="1444873" y="1663668"/>
+              <a:ext cx="3023679" cy="1077218"/>
             </a:xfrm>
             <a:prstGeom prst="rect">
               <a:avLst/>
@@ -7649,7 +7645,49 @@
                   </a:solidFill>
                   <a:cs typeface="Arial" pitchFamily="34" charset="0"/>
                 </a:rPr>
-                <a:t>COCOS2D-X</a:t>
+                <a:t>UNITY3D</a:t>
+              </a:r>
+            </a:p>
+            <a:p>
+              <a:r>
+                <a:rPr lang="en-US" altLang="ko-KR" sz="1600" dirty="0">
+                  <a:solidFill>
+                    <a:schemeClr val="tx1">
+                      <a:lumMod val="75000"/>
+                      <a:lumOff val="25000"/>
+                    </a:schemeClr>
+                  </a:solidFill>
+                  <a:cs typeface="Arial" pitchFamily="34" charset="0"/>
+                </a:rPr>
+                <a:t>SCALA – AKKA TOOLKIT</a:t>
+              </a:r>
+            </a:p>
+            <a:p>
+              <a:r>
+                <a:rPr lang="en-US" altLang="ko-KR" sz="1600" dirty="0">
+                  <a:solidFill>
+                    <a:schemeClr val="tx1">
+                      <a:lumMod val="75000"/>
+                      <a:lumOff val="25000"/>
+                    </a:schemeClr>
+                  </a:solidFill>
+                  <a:cs typeface="Arial" pitchFamily="34" charset="0"/>
+                </a:rPr>
+                <a:t>RUBY – RALS</a:t>
+              </a:r>
+            </a:p>
+            <a:p>
+              <a:r>
+                <a:rPr lang="en-US" altLang="ko-KR" sz="1600" dirty="0">
+                  <a:solidFill>
+                    <a:schemeClr val="tx1">
+                      <a:lumMod val="75000"/>
+                      <a:lumOff val="25000"/>
+                    </a:schemeClr>
+                  </a:solidFill>
+                  <a:cs typeface="Arial" pitchFamily="34" charset="0"/>
+                </a:rPr>
+                <a:t>C++ - SOCKET IO</a:t>
               </a:r>
             </a:p>
           </p:txBody>
@@ -7662,7 +7700,7 @@
           </p:nvSpPr>
           <p:spPr>
             <a:xfrm>
-              <a:off x="1447617" y="1535269"/>
+              <a:off x="1446245" y="1364048"/>
               <a:ext cx="3030085" cy="707886"/>
             </a:xfrm>
             <a:prstGeom prst="rect">
@@ -7880,44 +7918,41 @@
       </p:sp>
       <p:pic>
         <p:nvPicPr>
-          <p:cNvPr id="9" name="Hình ảnh 8">
+          <p:cNvPr id="4" name="Picture 3">
             <a:extLst>
               <a:ext uri="{FF2B5EF4-FFF2-40B4-BE49-F238E27FC236}">
-                <a16:creationId xmlns:a16="http://schemas.microsoft.com/office/drawing/2014/main" id="{63BF589C-C544-44FA-B2D9-DC51C3988380}"/>
+                <a16:creationId xmlns:a16="http://schemas.microsoft.com/office/drawing/2014/main" id="{AAB90F6F-38BE-460E-ABAF-D2A6C549E00B}"/>
               </a:ext>
             </a:extLst>
           </p:cNvPr>
-          <p:cNvPicPr>
-            <a:picLocks noChangeAspect="1"/>
-          </p:cNvPicPr>
+          <p:cNvPicPr/>
           <p:nvPr/>
         </p:nvPicPr>
         <p:blipFill>
-          <a:blip r:embed="rId2">
+          <a:blip r:embed="rId2" cstate="print">
             <a:extLst>
               <a:ext uri="{28A0092B-C50C-407E-A947-70E740481C1C}">
                 <a14:useLocalDpi xmlns:a14="http://schemas.microsoft.com/office/drawing/2010/main" val="0"/>
               </a:ext>
             </a:extLst>
           </a:blip>
+          <a:srcRect/>
           <a:stretch>
             <a:fillRect/>
           </a:stretch>
         </p:blipFill>
-        <p:spPr>
+        <p:spPr bwMode="auto">
           <a:xfrm>
-            <a:off x="2483768" y="1246607"/>
-            <a:ext cx="4458695" cy="3891580"/>
+            <a:off x="1691680" y="1059582"/>
+            <a:ext cx="5581650" cy="4262120"/>
           </a:xfrm>
           <a:prstGeom prst="rect">
             <a:avLst/>
           </a:prstGeom>
+          <a:noFill/>
           <a:ln>
             <a:noFill/>
           </a:ln>
-          <a:effectLst>
-            <a:softEdge rad="112500"/>
-          </a:effectLst>
         </p:spPr>
       </p:pic>
     </p:spTree>
@@ -7997,55 +8032,6 @@
           </a:p>
         </p:txBody>
       </p:sp>
-      <p:pic>
-        <p:nvPicPr>
-          <p:cNvPr id="4" name="Hình ảnh 3" descr="Ảnh có chứa ảnh, nhiều, che phủ, khác nhau&#10;&#10;Mô tả được tạo tự động">
-            <a:extLst>
-              <a:ext uri="{FF2B5EF4-FFF2-40B4-BE49-F238E27FC236}">
-                <a16:creationId xmlns:a16="http://schemas.microsoft.com/office/drawing/2014/main" id="{B3583155-2617-422C-9732-7261AAFE068F}"/>
-              </a:ext>
-            </a:extLst>
-          </p:cNvPr>
-          <p:cNvPicPr>
-            <a:picLocks noChangeAspect="1"/>
-          </p:cNvPicPr>
-          <p:nvPr/>
-        </p:nvPicPr>
-        <p:blipFill>
-          <a:blip r:embed="rId2">
-            <a:extLst>
-              <a:ext uri="{28A0092B-C50C-407E-A947-70E740481C1C}">
-                <a14:useLocalDpi xmlns:a14="http://schemas.microsoft.com/office/drawing/2010/main" val="0"/>
-              </a:ext>
-            </a:extLst>
-          </a:blip>
-          <a:stretch>
-            <a:fillRect/>
-          </a:stretch>
-        </p:blipFill>
-        <p:spPr>
-          <a:xfrm>
-            <a:off x="809836" y="771550"/>
-            <a:ext cx="7524328" cy="4157222"/>
-          </a:xfrm>
-          <a:prstGeom prst="roundRect">
-            <a:avLst>
-              <a:gd name="adj" fmla="val 8594"/>
-            </a:avLst>
-          </a:prstGeom>
-          <a:solidFill>
-            <a:srgbClr val="FFFFFF">
-              <a:shade val="85000"/>
-            </a:srgbClr>
-          </a:solidFill>
-          <a:ln>
-            <a:noFill/>
-          </a:ln>
-          <a:effectLst>
-            <a:reflection blurRad="12700" stA="38000" endPos="28000" dist="5000" dir="5400000" sy="-100000" algn="bl" rotWithShape="0"/>
-          </a:effectLst>
-        </p:spPr>
-      </p:pic>
     </p:spTree>
     <p:extLst>
       <p:ext uri="{BB962C8B-B14F-4D97-AF65-F5344CB8AC3E}">
@@ -10841,10 +10827,10 @@
         </p:nvGrpSpPr>
         <p:grpSpPr>
           <a:xfrm>
-            <a:off x="7472438" y="3673854"/>
-            <a:ext cx="1319916" cy="678649"/>
-            <a:chOff x="3233964" y="1954419"/>
-            <a:chExt cx="1410044" cy="678649"/>
+            <a:off x="7472438" y="3566133"/>
+            <a:ext cx="1319916" cy="878703"/>
+            <a:chOff x="3233964" y="1846698"/>
+            <a:chExt cx="1410044" cy="878703"/>
           </a:xfrm>
         </p:grpSpPr>
         <p:sp>
@@ -10855,8 +10841,8 @@
           </p:nvSpPr>
           <p:spPr>
             <a:xfrm>
-              <a:off x="3233964" y="1954419"/>
-              <a:ext cx="1400519" cy="307777"/>
+              <a:off x="3233964" y="1846698"/>
+              <a:ext cx="1400519" cy="523220"/>
             </a:xfrm>
             <a:prstGeom prst="rect">
               <a:avLst/>
@@ -10871,13 +10857,40 @@
             <a:p>
               <a:pPr algn="ctr"/>
               <a:r>
+                <a:rPr lang="en-US" altLang="ko-KR" sz="1400" b="1" dirty="0" err="1">
+                  <a:solidFill>
+                    <a:schemeClr val="bg1"/>
+                  </a:solidFill>
+                  <a:cs typeface="Arial" pitchFamily="34" charset="0"/>
+                </a:rPr>
+                <a:t>Mở</a:t>
+              </a:r>
+              <a:r>
                 <a:rPr lang="en-US" altLang="ko-KR" sz="1400" b="1" dirty="0">
                   <a:solidFill>
                     <a:schemeClr val="bg1"/>
                   </a:solidFill>
                   <a:cs typeface="Arial" pitchFamily="34" charset="0"/>
                 </a:rPr>
-                <a:t>Offline</a:t>
+                <a:t> </a:t>
+              </a:r>
+              <a:r>
+                <a:rPr lang="en-US" altLang="ko-KR" sz="1400" b="1" dirty="0" err="1">
+                  <a:solidFill>
+                    <a:schemeClr val="bg1"/>
+                  </a:solidFill>
+                  <a:cs typeface="Arial" pitchFamily="34" charset="0"/>
+                </a:rPr>
+                <a:t>rộng</a:t>
+              </a:r>
+              <a:r>
+                <a:rPr lang="en-US" altLang="ko-KR" sz="1400" b="1" dirty="0">
+                  <a:solidFill>
+                    <a:schemeClr val="bg1"/>
+                  </a:solidFill>
+                  <a:cs typeface="Arial" pitchFamily="34" charset="0"/>
+                </a:rPr>
+                <a:t> DLC</a:t>
               </a:r>
               <a:endParaRPr lang="ko-KR" altLang="en-US" sz="1400" b="1" dirty="0">
                 <a:solidFill>
@@ -10896,8 +10909,8 @@
           </p:nvSpPr>
           <p:spPr>
             <a:xfrm>
-              <a:off x="3243489" y="2356069"/>
-              <a:ext cx="1400519" cy="276999"/>
+              <a:off x="3243489" y="2263736"/>
+              <a:ext cx="1400519" cy="461665"/>
             </a:xfrm>
             <a:prstGeom prst="rect">
               <a:avLst/>
@@ -10912,13 +10925,67 @@
             <a:p>
               <a:pPr algn="ctr"/>
               <a:r>
+                <a:rPr lang="en-US" altLang="ko-KR" sz="1200" dirty="0" err="1">
+                  <a:solidFill>
+                    <a:schemeClr val="bg1"/>
+                  </a:solidFill>
+                  <a:cs typeface="Arial" pitchFamily="34" charset="0"/>
+                </a:rPr>
+                <a:t>Thiết</a:t>
+              </a:r>
+              <a:r>
                 <a:rPr lang="en-US" altLang="ko-KR" sz="1200" dirty="0">
                   <a:solidFill>
                     <a:schemeClr val="bg1"/>
                   </a:solidFill>
                   <a:cs typeface="Arial" pitchFamily="34" charset="0"/>
                 </a:rPr>
-                <a:t>CỐT TRUYỆN</a:t>
+                <a:t> </a:t>
+              </a:r>
+              <a:r>
+                <a:rPr lang="en-US" altLang="ko-KR" sz="1200" dirty="0" err="1">
+                  <a:solidFill>
+                    <a:schemeClr val="bg1"/>
+                  </a:solidFill>
+                  <a:cs typeface="Arial" pitchFamily="34" charset="0"/>
+                </a:rPr>
+                <a:t>kế</a:t>
+              </a:r>
+              <a:r>
+                <a:rPr lang="en-US" altLang="ko-KR" sz="1200" dirty="0">
+                  <a:solidFill>
+                    <a:schemeClr val="bg1"/>
+                  </a:solidFill>
+                  <a:cs typeface="Arial" pitchFamily="34" charset="0"/>
+                </a:rPr>
+                <a:t> </a:t>
+              </a:r>
+              <a:r>
+                <a:rPr lang="en-US" altLang="ko-KR" sz="1200" dirty="0" err="1">
+                  <a:solidFill>
+                    <a:schemeClr val="bg1"/>
+                  </a:solidFill>
+                  <a:cs typeface="Arial" pitchFamily="34" charset="0"/>
+                </a:rPr>
+                <a:t>màn</a:t>
+              </a:r>
+              <a:r>
+                <a:rPr lang="en-US" altLang="ko-KR" sz="1200" dirty="0">
+                  <a:solidFill>
+                    <a:schemeClr val="bg1"/>
+                  </a:solidFill>
+                  <a:cs typeface="Arial" pitchFamily="34" charset="0"/>
+                </a:rPr>
+                <a:t> </a:t>
+              </a:r>
+              <a:r>
+                <a:rPr lang="en-US" altLang="ko-KR" sz="1200" dirty="0" err="1">
+                  <a:solidFill>
+                    <a:schemeClr val="bg1"/>
+                  </a:solidFill>
+                  <a:cs typeface="Arial" pitchFamily="34" charset="0"/>
+                </a:rPr>
+                <a:t>chơi</a:t>
               </a:r>
               <a:endParaRPr lang="ko-KR" altLang="en-US" sz="1200" dirty="0">
                 <a:solidFill>
@@ -11290,10 +11357,10 @@
         </p:nvGrpSpPr>
         <p:grpSpPr>
           <a:xfrm>
-            <a:off x="458002" y="3653481"/>
-            <a:ext cx="1319916" cy="678649"/>
-            <a:chOff x="414112" y="3041945"/>
-            <a:chExt cx="1319916" cy="678649"/>
+            <a:off x="458002" y="3545760"/>
+            <a:ext cx="1319916" cy="878703"/>
+            <a:chOff x="414112" y="2934224"/>
+            <a:chExt cx="1319916" cy="878703"/>
           </a:xfrm>
         </p:grpSpPr>
         <p:sp>
@@ -11304,8 +11371,8 @@
           </p:nvSpPr>
           <p:spPr>
             <a:xfrm>
-              <a:off x="414112" y="3041945"/>
-              <a:ext cx="1311000" cy="307777"/>
+              <a:off x="414112" y="2934224"/>
+              <a:ext cx="1311000" cy="523220"/>
             </a:xfrm>
             <a:prstGeom prst="rect">
               <a:avLst/>
@@ -11320,6 +11387,18 @@
             <a:p>
               <a:pPr algn="ctr"/>
               <a:r>
+                <a:rPr lang="en-US" altLang="ko-KR" sz="1400" b="1" dirty="0" err="1">
+                  <a:solidFill>
+                    <a:schemeClr val="tx1">
+                      <a:lumMod val="75000"/>
+                      <a:lumOff val="25000"/>
+                    </a:schemeClr>
+                  </a:solidFill>
+                  <a:cs typeface="Arial" pitchFamily="34" charset="0"/>
+                </a:rPr>
+                <a:t>Mở</a:t>
+              </a:r>
+              <a:r>
                 <a:rPr lang="en-US" altLang="ko-KR" sz="1400" b="1" dirty="0">
                   <a:solidFill>
                     <a:schemeClr val="tx1">
@@ -11329,7 +11408,31 @@
                   </a:solidFill>
                   <a:cs typeface="Arial" pitchFamily="34" charset="0"/>
                 </a:rPr>
-                <a:t>Online</a:t>
+                <a:t> </a:t>
+              </a:r>
+              <a:r>
+                <a:rPr lang="en-US" altLang="ko-KR" sz="1400" b="1" dirty="0" err="1">
+                  <a:solidFill>
+                    <a:schemeClr val="tx1">
+                      <a:lumMod val="75000"/>
+                      <a:lumOff val="25000"/>
+                    </a:schemeClr>
+                  </a:solidFill>
+                  <a:cs typeface="Arial" pitchFamily="34" charset="0"/>
+                </a:rPr>
+                <a:t>rộng</a:t>
+              </a:r>
+              <a:r>
+                <a:rPr lang="en-US" altLang="ko-KR" sz="1400" b="1" dirty="0">
+                  <a:solidFill>
+                    <a:schemeClr val="tx1">
+                      <a:lumMod val="75000"/>
+                      <a:lumOff val="25000"/>
+                    </a:schemeClr>
+                  </a:solidFill>
+                  <a:cs typeface="Arial" pitchFamily="34" charset="0"/>
+                </a:rPr>
+                <a:t> game</a:t>
               </a:r>
               <a:endParaRPr lang="ko-KR" altLang="en-US" sz="1400" b="1" dirty="0">
                 <a:solidFill>
@@ -11351,8 +11454,8 @@
           </p:nvSpPr>
           <p:spPr>
             <a:xfrm>
-              <a:off x="423028" y="3443595"/>
-              <a:ext cx="1311000" cy="276999"/>
+              <a:off x="423028" y="3351262"/>
+              <a:ext cx="1311000" cy="461665"/>
             </a:xfrm>
             <a:prstGeom prst="rect">
               <a:avLst/>
@@ -11367,6 +11470,18 @@
             <a:p>
               <a:pPr algn="ctr"/>
               <a:r>
+                <a:rPr lang="en-US" altLang="ko-KR" sz="1200" dirty="0" err="1">
+                  <a:solidFill>
+                    <a:schemeClr val="tx1">
+                      <a:lumMod val="75000"/>
+                      <a:lumOff val="25000"/>
+                    </a:schemeClr>
+                  </a:solidFill>
+                  <a:cs typeface="Arial" pitchFamily="34" charset="0"/>
+                </a:rPr>
+                <a:t>Hệ</a:t>
+              </a:r>
+              <a:r>
                 <a:rPr lang="en-US" altLang="ko-KR" sz="1200" dirty="0">
                   <a:solidFill>
                     <a:schemeClr val="tx1">
@@ -11376,7 +11491,67 @@
                   </a:solidFill>
                   <a:cs typeface="Arial" pitchFamily="34" charset="0"/>
                 </a:rPr>
-                <a:t>TƯƠNG TÁC. </a:t>
+                <a:t> </a:t>
+              </a:r>
+              <a:r>
+                <a:rPr lang="en-US" altLang="ko-KR" sz="1200" dirty="0" err="1">
+                  <a:solidFill>
+                    <a:schemeClr val="tx1">
+                      <a:lumMod val="75000"/>
+                      <a:lumOff val="25000"/>
+                    </a:schemeClr>
+                  </a:solidFill>
+                  <a:cs typeface="Arial" pitchFamily="34" charset="0"/>
+                </a:rPr>
+                <a:t>thống</a:t>
+              </a:r>
+              <a:r>
+                <a:rPr lang="en-US" altLang="ko-KR" sz="1200" dirty="0">
+                  <a:solidFill>
+                    <a:schemeClr val="tx1">
+                      <a:lumMod val="75000"/>
+                      <a:lumOff val="25000"/>
+                    </a:schemeClr>
+                  </a:solidFill>
+                  <a:cs typeface="Arial" pitchFamily="34" charset="0"/>
+                </a:rPr>
+                <a:t> </a:t>
+              </a:r>
+              <a:r>
+                <a:rPr lang="en-US" altLang="ko-KR" sz="1200" dirty="0" err="1">
+                  <a:solidFill>
+                    <a:schemeClr val="tx1">
+                      <a:lumMod val="75000"/>
+                      <a:lumOff val="25000"/>
+                    </a:schemeClr>
+                  </a:solidFill>
+                  <a:cs typeface="Arial" pitchFamily="34" charset="0"/>
+                </a:rPr>
+                <a:t>cốt</a:t>
+              </a:r>
+              <a:r>
+                <a:rPr lang="en-US" altLang="ko-KR" sz="1200" dirty="0">
+                  <a:solidFill>
+                    <a:schemeClr val="tx1">
+                      <a:lumMod val="75000"/>
+                      <a:lumOff val="25000"/>
+                    </a:schemeClr>
+                  </a:solidFill>
+                  <a:cs typeface="Arial" pitchFamily="34" charset="0"/>
+                </a:rPr>
+                <a:t> </a:t>
+              </a:r>
+              <a:r>
+                <a:rPr lang="en-US" altLang="ko-KR" sz="1200" dirty="0" err="1">
+                  <a:solidFill>
+                    <a:schemeClr val="tx1">
+                      <a:lumMod val="75000"/>
+                      <a:lumOff val="25000"/>
+                    </a:schemeClr>
+                  </a:solidFill>
+                  <a:cs typeface="Arial" pitchFamily="34" charset="0"/>
+                </a:rPr>
+                <a:t>truyện</a:t>
               </a:r>
               <a:endParaRPr lang="ko-KR" altLang="en-US" sz="1200" dirty="0">
                 <a:solidFill>

</xml_diff>

<commit_message>
Update slide and report
</commit_message>
<xml_diff>
--- a/documents/Slide.pptx
+++ b/documents/Slide.pptx
@@ -11,7 +11,7 @@
     <p:sldId id="261" r:id="rId5"/>
     <p:sldId id="265" r:id="rId6"/>
     <p:sldId id="294" r:id="rId7"/>
-    <p:sldId id="304" r:id="rId8"/>
+    <p:sldId id="295" r:id="rId8"/>
     <p:sldId id="288" r:id="rId9"/>
     <p:sldId id="290" r:id="rId10"/>
     <p:sldId id="271" r:id="rId11"/>
@@ -5016,30 +5016,6 @@
             </a:r>
             <a:r>
               <a:rPr lang="en-US" altLang="ko-KR" sz="1200" dirty="0"/>
-              <a:t>, </a:t>
-            </a:r>
-            <a:r>
-              <a:rPr lang="en-US" altLang="ko-KR" sz="1200" dirty="0" err="1"/>
-              <a:t>Huỳnh</a:t>
-            </a:r>
-            <a:r>
-              <a:rPr lang="en-US" altLang="ko-KR" sz="1200" dirty="0"/>
-              <a:t> </a:t>
-            </a:r>
-            <a:r>
-              <a:rPr lang="en-US" altLang="ko-KR" sz="1200" dirty="0" err="1"/>
-              <a:t>Thiện</a:t>
-            </a:r>
-            <a:r>
-              <a:rPr lang="en-US" altLang="ko-KR" sz="1200" dirty="0"/>
-              <a:t> </a:t>
-            </a:r>
-            <a:r>
-              <a:rPr lang="en-US" altLang="ko-KR" sz="1200" dirty="0" err="1"/>
-              <a:t>Hữu</a:t>
-            </a:r>
-            <a:r>
-              <a:rPr lang="en-US" altLang="ko-KR" sz="1200" dirty="0"/>
               <a:t> &amp; Nguyễn </a:t>
             </a:r>
             <a:r>
@@ -7503,7 +7479,7 @@
                   </a:solidFill>
                   <a:cs typeface="Arial" pitchFamily="34" charset="0"/>
                 </a:rPr>
-                <a:t>BẮN KIM CƯƠNG</a:t>
+                <a:t>LEGEND OF PIRATE</a:t>
               </a:r>
             </a:p>
             <a:p>
@@ -7517,7 +7493,7 @@
                   </a:solidFill>
                   <a:cs typeface="Arial" pitchFamily="34" charset="0"/>
                 </a:rPr>
-                <a:t>OPEN WORLD</a:t>
+                <a:t>(OPEN WORLD)</a:t>
               </a:r>
               <a:endParaRPr lang="ko-KR" altLang="en-US" sz="1600" dirty="0">
                 <a:solidFill>
@@ -7607,10 +7583,10 @@
         </p:nvGrpSpPr>
         <p:grpSpPr>
           <a:xfrm>
-            <a:off x="5652252" y="884287"/>
-            <a:ext cx="2934143" cy="2491368"/>
+            <a:off x="5652252" y="884288"/>
+            <a:ext cx="2934143" cy="1809151"/>
             <a:chOff x="1444873" y="1364048"/>
-            <a:chExt cx="3031457" cy="1376838"/>
+            <a:chExt cx="3031457" cy="999815"/>
           </a:xfrm>
         </p:grpSpPr>
         <p:sp>
@@ -7621,8 +7597,8 @@
           </p:nvSpPr>
           <p:spPr>
             <a:xfrm>
-              <a:off x="1444873" y="1663668"/>
-              <a:ext cx="3023679" cy="1077218"/>
+              <a:off x="1444873" y="2040691"/>
+              <a:ext cx="3023679" cy="323172"/>
             </a:xfrm>
             <a:prstGeom prst="rect">
               <a:avLst/>
@@ -7645,7 +7621,7 @@
                   </a:solidFill>
                   <a:cs typeface="Arial" pitchFamily="34" charset="0"/>
                 </a:rPr>
-                <a:t>UNITY3D</a:t>
+                <a:t>C# - UNITY3D</a:t>
               </a:r>
             </a:p>
             <a:p>
@@ -7659,35 +7635,7 @@
                   </a:solidFill>
                   <a:cs typeface="Arial" pitchFamily="34" charset="0"/>
                 </a:rPr>
-                <a:t>SCALA – AKKA TOOLKIT</a:t>
-              </a:r>
-            </a:p>
-            <a:p>
-              <a:r>
-                <a:rPr lang="en-US" altLang="ko-KR" sz="1600" dirty="0">
-                  <a:solidFill>
-                    <a:schemeClr val="tx1">
-                      <a:lumMod val="75000"/>
-                      <a:lumOff val="25000"/>
-                    </a:schemeClr>
-                  </a:solidFill>
-                  <a:cs typeface="Arial" pitchFamily="34" charset="0"/>
-                </a:rPr>
-                <a:t>RUBY – RALS</a:t>
-              </a:r>
-            </a:p>
-            <a:p>
-              <a:r>
-                <a:rPr lang="en-US" altLang="ko-KR" sz="1600" dirty="0">
-                  <a:solidFill>
-                    <a:schemeClr val="tx1">
-                      <a:lumMod val="75000"/>
-                      <a:lumOff val="25000"/>
-                    </a:schemeClr>
-                  </a:solidFill>
-                  <a:cs typeface="Arial" pitchFamily="34" charset="0"/>
-                </a:rPr>
-                <a:t>C++ - SOCKET IO</a:t>
+                <a:t>SCALA - AKKA TOOLKIT</a:t>
               </a:r>
             </a:p>
           </p:txBody>
@@ -7943,7 +7891,7 @@
         </p:blipFill>
         <p:spPr bwMode="auto">
           <a:xfrm>
-            <a:off x="1691680" y="1059582"/>
+            <a:off x="1907704" y="870006"/>
             <a:ext cx="5581650" cy="4262120"/>
           </a:xfrm>
           <a:prstGeom prst="rect">
@@ -8032,10 +7980,855 @@
           </a:p>
         </p:txBody>
       </p:sp>
+      <p:sp>
+        <p:nvSpPr>
+          <p:cNvPr id="4" name="Oval 3"/>
+          <p:cNvSpPr/>
+          <p:nvPr/>
+        </p:nvSpPr>
+        <p:spPr>
+          <a:xfrm>
+            <a:off x="4849012" y="1690289"/>
+            <a:ext cx="693414" cy="693414"/>
+          </a:xfrm>
+          <a:prstGeom prst="ellipse">
+            <a:avLst/>
+          </a:prstGeom>
+          <a:solidFill>
+            <a:schemeClr val="accent2"/>
+          </a:solidFill>
+          <a:ln>
+            <a:noFill/>
+          </a:ln>
+        </p:spPr>
+        <p:style>
+          <a:lnRef idx="2">
+            <a:schemeClr val="accent1">
+              <a:shade val="50000"/>
+            </a:schemeClr>
+          </a:lnRef>
+          <a:fillRef idx="1">
+            <a:schemeClr val="accent1"/>
+          </a:fillRef>
+          <a:effectRef idx="0">
+            <a:schemeClr val="accent1"/>
+          </a:effectRef>
+          <a:fontRef idx="minor">
+            <a:schemeClr val="lt1"/>
+          </a:fontRef>
+        </p:style>
+        <p:txBody>
+          <a:bodyPr rtlCol="0" anchor="ctr"/>
+          <a:lstStyle/>
+          <a:p>
+            <a:pPr algn="ctr"/>
+            <a:endParaRPr lang="ko-KR" altLang="en-US"/>
+          </a:p>
+        </p:txBody>
+      </p:sp>
+      <p:sp>
+        <p:nvSpPr>
+          <p:cNvPr id="5" name="Oval 4"/>
+          <p:cNvSpPr/>
+          <p:nvPr/>
+        </p:nvSpPr>
+        <p:spPr>
+          <a:xfrm>
+            <a:off x="672724" y="1690289"/>
+            <a:ext cx="693414" cy="693414"/>
+          </a:xfrm>
+          <a:prstGeom prst="ellipse">
+            <a:avLst/>
+          </a:prstGeom>
+          <a:solidFill>
+            <a:schemeClr val="accent1"/>
+          </a:solidFill>
+          <a:ln>
+            <a:noFill/>
+          </a:ln>
+        </p:spPr>
+        <p:style>
+          <a:lnRef idx="2">
+            <a:schemeClr val="accent1">
+              <a:shade val="50000"/>
+            </a:schemeClr>
+          </a:lnRef>
+          <a:fillRef idx="1">
+            <a:schemeClr val="accent1"/>
+          </a:fillRef>
+          <a:effectRef idx="0">
+            <a:schemeClr val="accent1"/>
+          </a:effectRef>
+          <a:fontRef idx="minor">
+            <a:schemeClr val="lt1"/>
+          </a:fontRef>
+        </p:style>
+        <p:txBody>
+          <a:bodyPr rtlCol="0" anchor="ctr"/>
+          <a:lstStyle/>
+          <a:p>
+            <a:pPr algn="ctr"/>
+            <a:endParaRPr lang="ko-KR" altLang="en-US"/>
+          </a:p>
+        </p:txBody>
+      </p:sp>
+      <p:sp>
+        <p:nvSpPr>
+          <p:cNvPr id="6" name="Oval 5"/>
+          <p:cNvSpPr/>
+          <p:nvPr/>
+        </p:nvSpPr>
+        <p:spPr>
+          <a:xfrm>
+            <a:off x="2699792" y="3255977"/>
+            <a:ext cx="693414" cy="693414"/>
+          </a:xfrm>
+          <a:prstGeom prst="ellipse">
+            <a:avLst/>
+          </a:prstGeom>
+          <a:solidFill>
+            <a:schemeClr val="accent4"/>
+          </a:solidFill>
+          <a:ln>
+            <a:noFill/>
+          </a:ln>
+        </p:spPr>
+        <p:style>
+          <a:lnRef idx="2">
+            <a:schemeClr val="accent1">
+              <a:shade val="50000"/>
+            </a:schemeClr>
+          </a:lnRef>
+          <a:fillRef idx="1">
+            <a:schemeClr val="accent1"/>
+          </a:fillRef>
+          <a:effectRef idx="0">
+            <a:schemeClr val="accent1"/>
+          </a:effectRef>
+          <a:fontRef idx="minor">
+            <a:schemeClr val="lt1"/>
+          </a:fontRef>
+        </p:style>
+        <p:txBody>
+          <a:bodyPr rtlCol="0" anchor="ctr"/>
+          <a:lstStyle/>
+          <a:p>
+            <a:pPr algn="ctr"/>
+            <a:endParaRPr lang="ko-KR" altLang="en-US"/>
+          </a:p>
+        </p:txBody>
+      </p:sp>
+      <p:sp>
+        <p:nvSpPr>
+          <p:cNvPr id="8" name="TextBox 7"/>
+          <p:cNvSpPr txBox="1"/>
+          <p:nvPr/>
+        </p:nvSpPr>
+        <p:spPr>
+          <a:xfrm>
+            <a:off x="717112" y="1821553"/>
+            <a:ext cx="604639" cy="430887"/>
+          </a:xfrm>
+          <a:prstGeom prst="rect">
+            <a:avLst/>
+          </a:prstGeom>
+          <a:noFill/>
+        </p:spPr>
+        <p:txBody>
+          <a:bodyPr wrap="square" tIns="0" bIns="0" rtlCol="0" anchor="ctr">
+            <a:spAutoFit/>
+          </a:bodyPr>
+          <a:lstStyle/>
+          <a:p>
+            <a:r>
+              <a:rPr lang="en-US" altLang="ko-KR" sz="2800" b="1" dirty="0">
+                <a:solidFill>
+                  <a:schemeClr val="bg1"/>
+                </a:solidFill>
+                <a:cs typeface="Arial" pitchFamily="34" charset="0"/>
+              </a:rPr>
+              <a:t>01</a:t>
+            </a:r>
+          </a:p>
+        </p:txBody>
+      </p:sp>
+      <p:sp>
+        <p:nvSpPr>
+          <p:cNvPr id="9" name="TextBox 8"/>
+          <p:cNvSpPr txBox="1"/>
+          <p:nvPr/>
+        </p:nvSpPr>
+        <p:spPr>
+          <a:xfrm>
+            <a:off x="2744179" y="3387241"/>
+            <a:ext cx="604639" cy="430887"/>
+          </a:xfrm>
+          <a:prstGeom prst="rect">
+            <a:avLst/>
+          </a:prstGeom>
+          <a:noFill/>
+        </p:spPr>
+        <p:txBody>
+          <a:bodyPr wrap="square" tIns="0" bIns="0" rtlCol="0" anchor="ctr">
+            <a:spAutoFit/>
+          </a:bodyPr>
+          <a:lstStyle/>
+          <a:p>
+            <a:r>
+              <a:rPr lang="en-US" altLang="ko-KR" sz="2800" b="1" dirty="0">
+                <a:solidFill>
+                  <a:schemeClr val="bg1"/>
+                </a:solidFill>
+                <a:cs typeface="Arial" pitchFamily="34" charset="0"/>
+              </a:rPr>
+              <a:t>03</a:t>
+            </a:r>
+          </a:p>
+        </p:txBody>
+      </p:sp>
+      <p:sp>
+        <p:nvSpPr>
+          <p:cNvPr id="10" name="TextBox 9"/>
+          <p:cNvSpPr txBox="1"/>
+          <p:nvPr/>
+        </p:nvSpPr>
+        <p:spPr>
+          <a:xfrm>
+            <a:off x="4893400" y="1821553"/>
+            <a:ext cx="604639" cy="430887"/>
+          </a:xfrm>
+          <a:prstGeom prst="rect">
+            <a:avLst/>
+          </a:prstGeom>
+          <a:noFill/>
+        </p:spPr>
+        <p:txBody>
+          <a:bodyPr wrap="square" tIns="0" bIns="0" rtlCol="0" anchor="ctr">
+            <a:spAutoFit/>
+          </a:bodyPr>
+          <a:lstStyle/>
+          <a:p>
+            <a:r>
+              <a:rPr lang="en-US" altLang="ko-KR" sz="2800" b="1" dirty="0">
+                <a:solidFill>
+                  <a:schemeClr val="bg1"/>
+                </a:solidFill>
+                <a:cs typeface="Arial" pitchFamily="34" charset="0"/>
+              </a:rPr>
+              <a:t>02</a:t>
+            </a:r>
+          </a:p>
+        </p:txBody>
+      </p:sp>
+      <p:sp>
+        <p:nvSpPr>
+          <p:cNvPr id="11" name="TextBox 10"/>
+          <p:cNvSpPr txBox="1"/>
+          <p:nvPr/>
+        </p:nvSpPr>
+        <p:spPr>
+          <a:xfrm>
+            <a:off x="4893400" y="3458493"/>
+            <a:ext cx="604639" cy="430887"/>
+          </a:xfrm>
+          <a:prstGeom prst="rect">
+            <a:avLst/>
+          </a:prstGeom>
+          <a:noFill/>
+        </p:spPr>
+        <p:txBody>
+          <a:bodyPr wrap="square" tIns="0" bIns="0" rtlCol="0" anchor="ctr">
+            <a:spAutoFit/>
+          </a:bodyPr>
+          <a:lstStyle/>
+          <a:p>
+            <a:r>
+              <a:rPr lang="en-US" altLang="ko-KR" sz="2800" b="1" dirty="0">
+                <a:solidFill>
+                  <a:schemeClr val="bg1"/>
+                </a:solidFill>
+                <a:cs typeface="Arial" pitchFamily="34" charset="0"/>
+              </a:rPr>
+              <a:t>04</a:t>
+            </a:r>
+          </a:p>
+        </p:txBody>
+      </p:sp>
+      <p:grpSp>
+        <p:nvGrpSpPr>
+          <p:cNvPr id="12" name="Group 11"/>
+          <p:cNvGrpSpPr/>
+          <p:nvPr/>
+        </p:nvGrpSpPr>
+        <p:grpSpPr>
+          <a:xfrm>
+            <a:off x="1432669" y="1421443"/>
+            <a:ext cx="2932815" cy="1169551"/>
+            <a:chOff x="1448989" y="1533725"/>
+            <a:chExt cx="3030085" cy="1169551"/>
+          </a:xfrm>
+        </p:grpSpPr>
+        <p:sp>
+          <p:nvSpPr>
+            <p:cNvPr id="13" name="TextBox 12"/>
+            <p:cNvSpPr txBox="1"/>
+            <p:nvPr/>
+          </p:nvSpPr>
+          <p:spPr>
+            <a:xfrm>
+              <a:off x="1454023" y="1872279"/>
+              <a:ext cx="3023679" cy="830997"/>
+            </a:xfrm>
+            <a:prstGeom prst="rect">
+              <a:avLst/>
+            </a:prstGeom>
+            <a:noFill/>
+          </p:spPr>
+          <p:txBody>
+            <a:bodyPr wrap="square" rtlCol="0" anchor="ctr">
+              <a:spAutoFit/>
+            </a:bodyPr>
+            <a:lstStyle/>
+            <a:p>
+              <a:r>
+                <a:rPr lang="en-US" altLang="ko-KR" sz="1600" dirty="0" err="1">
+                  <a:solidFill>
+                    <a:schemeClr val="tx1">
+                      <a:lumMod val="75000"/>
+                      <a:lumOff val="25000"/>
+                    </a:schemeClr>
+                  </a:solidFill>
+                  <a:cs typeface="Arial" pitchFamily="34" charset="0"/>
+                </a:rPr>
+                <a:t>Cách</a:t>
+              </a:r>
+              <a:r>
+                <a:rPr lang="en-US" altLang="ko-KR" sz="1600" dirty="0">
+                  <a:solidFill>
+                    <a:schemeClr val="tx1">
+                      <a:lumMod val="75000"/>
+                      <a:lumOff val="25000"/>
+                    </a:schemeClr>
+                  </a:solidFill>
+                  <a:cs typeface="Arial" pitchFamily="34" charset="0"/>
+                </a:rPr>
+                <a:t> </a:t>
+              </a:r>
+              <a:r>
+                <a:rPr lang="en-US" altLang="ko-KR" sz="1600" dirty="0" err="1">
+                  <a:solidFill>
+                    <a:schemeClr val="tx1">
+                      <a:lumMod val="75000"/>
+                      <a:lumOff val="25000"/>
+                    </a:schemeClr>
+                  </a:solidFill>
+                  <a:cs typeface="Arial" pitchFamily="34" charset="0"/>
+                </a:rPr>
+                <a:t>chơi</a:t>
+              </a:r>
+              <a:endParaRPr lang="en-US" altLang="ko-KR" sz="1600" dirty="0">
+                <a:solidFill>
+                  <a:schemeClr val="tx1">
+                    <a:lumMod val="75000"/>
+                    <a:lumOff val="25000"/>
+                  </a:schemeClr>
+                </a:solidFill>
+                <a:cs typeface="Arial" pitchFamily="34" charset="0"/>
+              </a:endParaRPr>
+            </a:p>
+            <a:p>
+              <a:r>
+                <a:rPr lang="en-US" altLang="ko-KR" sz="1600" dirty="0" err="1">
+                  <a:solidFill>
+                    <a:schemeClr val="tx1">
+                      <a:lumMod val="75000"/>
+                      <a:lumOff val="25000"/>
+                    </a:schemeClr>
+                  </a:solidFill>
+                  <a:cs typeface="Arial" pitchFamily="34" charset="0"/>
+                </a:rPr>
+                <a:t>Các</a:t>
+              </a:r>
+              <a:r>
+                <a:rPr lang="en-US" altLang="ko-KR" sz="1600" dirty="0">
+                  <a:solidFill>
+                    <a:schemeClr val="tx1">
+                      <a:lumMod val="75000"/>
+                      <a:lumOff val="25000"/>
+                    </a:schemeClr>
+                  </a:solidFill>
+                  <a:cs typeface="Arial" pitchFamily="34" charset="0"/>
+                </a:rPr>
+                <a:t> </a:t>
+              </a:r>
+              <a:r>
+                <a:rPr lang="en-US" altLang="ko-KR" sz="1600" dirty="0" err="1">
+                  <a:solidFill>
+                    <a:schemeClr val="tx1">
+                      <a:lumMod val="75000"/>
+                      <a:lumOff val="25000"/>
+                    </a:schemeClr>
+                  </a:solidFill>
+                  <a:cs typeface="Arial" pitchFamily="34" charset="0"/>
+                </a:rPr>
+                <a:t>thuật</a:t>
+              </a:r>
+              <a:r>
+                <a:rPr lang="en-US" altLang="ko-KR" sz="1600" dirty="0">
+                  <a:solidFill>
+                    <a:schemeClr val="tx1">
+                      <a:lumMod val="75000"/>
+                      <a:lumOff val="25000"/>
+                    </a:schemeClr>
+                  </a:solidFill>
+                  <a:cs typeface="Arial" pitchFamily="34" charset="0"/>
+                </a:rPr>
+                <a:t> </a:t>
+              </a:r>
+              <a:r>
+                <a:rPr lang="en-US" altLang="ko-KR" sz="1600" dirty="0" err="1">
+                  <a:solidFill>
+                    <a:schemeClr val="tx1">
+                      <a:lumMod val="75000"/>
+                      <a:lumOff val="25000"/>
+                    </a:schemeClr>
+                  </a:solidFill>
+                  <a:cs typeface="Arial" pitchFamily="34" charset="0"/>
+                </a:rPr>
+                <a:t>toán</a:t>
+              </a:r>
+              <a:r>
+                <a:rPr lang="en-US" altLang="ko-KR" sz="1600" dirty="0">
+                  <a:solidFill>
+                    <a:schemeClr val="tx1">
+                      <a:lumMod val="75000"/>
+                      <a:lumOff val="25000"/>
+                    </a:schemeClr>
+                  </a:solidFill>
+                  <a:cs typeface="Arial" pitchFamily="34" charset="0"/>
+                </a:rPr>
+                <a:t> </a:t>
+              </a:r>
+              <a:r>
+                <a:rPr lang="en-US" altLang="ko-KR" sz="1600" dirty="0" err="1">
+                  <a:solidFill>
+                    <a:schemeClr val="tx1">
+                      <a:lumMod val="75000"/>
+                      <a:lumOff val="25000"/>
+                    </a:schemeClr>
+                  </a:solidFill>
+                  <a:cs typeface="Arial" pitchFamily="34" charset="0"/>
+                </a:rPr>
+                <a:t>sử</a:t>
+              </a:r>
+              <a:r>
+                <a:rPr lang="en-US" altLang="ko-KR" sz="1600" dirty="0">
+                  <a:solidFill>
+                    <a:schemeClr val="tx1">
+                      <a:lumMod val="75000"/>
+                      <a:lumOff val="25000"/>
+                    </a:schemeClr>
+                  </a:solidFill>
+                  <a:cs typeface="Arial" pitchFamily="34" charset="0"/>
+                </a:rPr>
+                <a:t> </a:t>
+              </a:r>
+              <a:r>
+                <a:rPr lang="en-US" altLang="ko-KR" sz="1600" dirty="0" err="1">
+                  <a:solidFill>
+                    <a:schemeClr val="tx1">
+                      <a:lumMod val="75000"/>
+                      <a:lumOff val="25000"/>
+                    </a:schemeClr>
+                  </a:solidFill>
+                  <a:cs typeface="Arial" pitchFamily="34" charset="0"/>
+                </a:rPr>
+                <a:t>dụng</a:t>
+              </a:r>
+              <a:r>
+                <a:rPr lang="en-US" altLang="ko-KR" sz="1600" dirty="0">
+                  <a:solidFill>
+                    <a:schemeClr val="tx1">
+                      <a:lumMod val="75000"/>
+                      <a:lumOff val="25000"/>
+                    </a:schemeClr>
+                  </a:solidFill>
+                  <a:cs typeface="Arial" pitchFamily="34" charset="0"/>
+                </a:rPr>
+                <a:t>,…</a:t>
+              </a:r>
+            </a:p>
+            <a:p>
+              <a:r>
+                <a:rPr lang="en-US" altLang="ko-KR" sz="1600" dirty="0">
+                  <a:solidFill>
+                    <a:schemeClr val="tx1">
+                      <a:lumMod val="75000"/>
+                      <a:lumOff val="25000"/>
+                    </a:schemeClr>
+                  </a:solidFill>
+                  <a:cs typeface="Arial" pitchFamily="34" charset="0"/>
+                </a:rPr>
+                <a:t>(</a:t>
+              </a:r>
+              <a:r>
+                <a:rPr lang="en-US" altLang="ko-KR" sz="1600" dirty="0" err="1">
+                  <a:solidFill>
+                    <a:schemeClr val="tx1">
+                      <a:lumMod val="75000"/>
+                      <a:lumOff val="25000"/>
+                    </a:schemeClr>
+                  </a:solidFill>
+                  <a:cs typeface="Arial" pitchFamily="34" charset="0"/>
+                </a:rPr>
+                <a:t>Phần</a:t>
+              </a:r>
+              <a:r>
+                <a:rPr lang="en-US" altLang="ko-KR" sz="1600" dirty="0">
+                  <a:solidFill>
+                    <a:schemeClr val="tx1">
+                      <a:lumMod val="75000"/>
+                      <a:lumOff val="25000"/>
+                    </a:schemeClr>
+                  </a:solidFill>
+                  <a:cs typeface="Arial" pitchFamily="34" charset="0"/>
+                </a:rPr>
+                <a:t> offline)</a:t>
+              </a:r>
+            </a:p>
+          </p:txBody>
+        </p:sp>
+        <p:sp>
+          <p:nvSpPr>
+            <p:cNvPr id="14" name="TextBox 13"/>
+            <p:cNvSpPr txBox="1"/>
+            <p:nvPr/>
+          </p:nvSpPr>
+          <p:spPr>
+            <a:xfrm>
+              <a:off x="1448989" y="1533725"/>
+              <a:ext cx="3030085" cy="400110"/>
+            </a:xfrm>
+            <a:prstGeom prst="rect">
+              <a:avLst/>
+            </a:prstGeom>
+            <a:noFill/>
+          </p:spPr>
+          <p:txBody>
+            <a:bodyPr wrap="square" rtlCol="0" anchor="ctr">
+              <a:spAutoFit/>
+            </a:bodyPr>
+            <a:lstStyle/>
+            <a:p>
+              <a:r>
+                <a:rPr lang="en-US" altLang="ko-KR" sz="2000" b="1" dirty="0">
+                  <a:solidFill>
+                    <a:schemeClr val="accent1"/>
+                  </a:solidFill>
+                  <a:cs typeface="Arial" pitchFamily="34" charset="0"/>
+                </a:rPr>
+                <a:t>Gameplay</a:t>
+              </a:r>
+              <a:endParaRPr lang="ko-KR" altLang="en-US" sz="2000" b="1" dirty="0">
+                <a:solidFill>
+                  <a:schemeClr val="accent1"/>
+                </a:solidFill>
+                <a:cs typeface="Arial" pitchFamily="34" charset="0"/>
+              </a:endParaRPr>
+            </a:p>
+          </p:txBody>
+        </p:sp>
+      </p:grpSp>
+      <p:grpSp>
+        <p:nvGrpSpPr>
+          <p:cNvPr id="15" name="Group 14"/>
+          <p:cNvGrpSpPr/>
+          <p:nvPr/>
+        </p:nvGrpSpPr>
+        <p:grpSpPr>
+          <a:xfrm>
+            <a:off x="3433174" y="3002519"/>
+            <a:ext cx="2932815" cy="954107"/>
+            <a:chOff x="1448989" y="1502947"/>
+            <a:chExt cx="3030085" cy="954107"/>
+          </a:xfrm>
+        </p:grpSpPr>
+        <p:sp>
+          <p:nvSpPr>
+            <p:cNvPr id="16" name="TextBox 15"/>
+            <p:cNvSpPr txBox="1"/>
+            <p:nvPr/>
+          </p:nvSpPr>
+          <p:spPr>
+            <a:xfrm>
+              <a:off x="1454023" y="2118500"/>
+              <a:ext cx="3023679" cy="338554"/>
+            </a:xfrm>
+            <a:prstGeom prst="rect">
+              <a:avLst/>
+            </a:prstGeom>
+            <a:noFill/>
+          </p:spPr>
+          <p:txBody>
+            <a:bodyPr wrap="square" rtlCol="0" anchor="ctr">
+              <a:spAutoFit/>
+            </a:bodyPr>
+            <a:lstStyle/>
+            <a:p>
+              <a:endParaRPr lang="en-US" altLang="ko-KR" sz="1600" dirty="0">
+                <a:solidFill>
+                  <a:schemeClr val="tx1">
+                    <a:lumMod val="75000"/>
+                    <a:lumOff val="25000"/>
+                  </a:schemeClr>
+                </a:solidFill>
+                <a:cs typeface="Arial" pitchFamily="34" charset="0"/>
+              </a:endParaRPr>
+            </a:p>
+          </p:txBody>
+        </p:sp>
+        <p:sp>
+          <p:nvSpPr>
+            <p:cNvPr id="17" name="TextBox 16"/>
+            <p:cNvSpPr txBox="1"/>
+            <p:nvPr/>
+          </p:nvSpPr>
+          <p:spPr>
+            <a:xfrm>
+              <a:off x="1448989" y="1502947"/>
+              <a:ext cx="3030085" cy="461665"/>
+            </a:xfrm>
+            <a:prstGeom prst="rect">
+              <a:avLst/>
+            </a:prstGeom>
+            <a:noFill/>
+          </p:spPr>
+          <p:txBody>
+            <a:bodyPr wrap="square" rtlCol="0" anchor="ctr">
+              <a:spAutoFit/>
+            </a:bodyPr>
+            <a:lstStyle/>
+            <a:p>
+              <a:r>
+                <a:rPr lang="en-US" altLang="ko-KR" sz="2400" b="1" dirty="0" err="1">
+                  <a:solidFill>
+                    <a:schemeClr val="accent4"/>
+                  </a:solidFill>
+                  <a:cs typeface="Arial" pitchFamily="34" charset="0"/>
+                </a:rPr>
+                <a:t>Playgame</a:t>
+              </a:r>
+              <a:endParaRPr lang="ko-KR" altLang="en-US" sz="2400" b="1" dirty="0">
+                <a:solidFill>
+                  <a:schemeClr val="accent4"/>
+                </a:solidFill>
+                <a:cs typeface="Arial" pitchFamily="34" charset="0"/>
+              </a:endParaRPr>
+            </a:p>
+          </p:txBody>
+        </p:sp>
+      </p:grpSp>
+      <p:grpSp>
+        <p:nvGrpSpPr>
+          <p:cNvPr id="18" name="Group 17"/>
+          <p:cNvGrpSpPr/>
+          <p:nvPr/>
+        </p:nvGrpSpPr>
+        <p:grpSpPr>
+          <a:xfrm>
+            <a:off x="5652252" y="1324688"/>
+            <a:ext cx="2934143" cy="1368751"/>
+            <a:chOff x="1444873" y="1607432"/>
+            <a:chExt cx="3031457" cy="756431"/>
+          </a:xfrm>
+        </p:grpSpPr>
+        <p:sp>
+          <p:nvSpPr>
+            <p:cNvPr id="19" name="TextBox 18"/>
+            <p:cNvSpPr txBox="1"/>
+            <p:nvPr/>
+          </p:nvSpPr>
+          <p:spPr>
+            <a:xfrm>
+              <a:off x="1444873" y="2040691"/>
+              <a:ext cx="3023679" cy="323172"/>
+            </a:xfrm>
+            <a:prstGeom prst="rect">
+              <a:avLst/>
+            </a:prstGeom>
+            <a:noFill/>
+          </p:spPr>
+          <p:txBody>
+            <a:bodyPr wrap="square" rtlCol="0" anchor="ctr">
+              <a:spAutoFit/>
+            </a:bodyPr>
+            <a:lstStyle/>
+            <a:p>
+              <a:r>
+                <a:rPr lang="en-US" altLang="ko-KR" sz="1600" dirty="0" err="1">
+                  <a:solidFill>
+                    <a:schemeClr val="tx1">
+                      <a:lumMod val="75000"/>
+                      <a:lumOff val="25000"/>
+                    </a:schemeClr>
+                  </a:solidFill>
+                  <a:cs typeface="Arial" pitchFamily="34" charset="0"/>
+                </a:rPr>
+                <a:t>Cách</a:t>
+              </a:r>
+              <a:r>
+                <a:rPr lang="en-US" altLang="ko-KR" sz="1600" dirty="0">
+                  <a:solidFill>
+                    <a:schemeClr val="tx1">
+                      <a:lumMod val="75000"/>
+                      <a:lumOff val="25000"/>
+                    </a:schemeClr>
+                  </a:solidFill>
+                  <a:cs typeface="Arial" pitchFamily="34" charset="0"/>
+                </a:rPr>
+                <a:t> </a:t>
+              </a:r>
+              <a:r>
+                <a:rPr lang="en-US" altLang="ko-KR" sz="1600" dirty="0" err="1">
+                  <a:solidFill>
+                    <a:schemeClr val="tx1">
+                      <a:lumMod val="75000"/>
+                      <a:lumOff val="25000"/>
+                    </a:schemeClr>
+                  </a:solidFill>
+                  <a:cs typeface="Arial" pitchFamily="34" charset="0"/>
+                </a:rPr>
+                <a:t>hoạt</a:t>
+              </a:r>
+              <a:r>
+                <a:rPr lang="en-US" altLang="ko-KR" sz="1600" dirty="0">
+                  <a:solidFill>
+                    <a:schemeClr val="tx1">
+                      <a:lumMod val="75000"/>
+                      <a:lumOff val="25000"/>
+                    </a:schemeClr>
+                  </a:solidFill>
+                  <a:cs typeface="Arial" pitchFamily="34" charset="0"/>
+                </a:rPr>
+                <a:t> </a:t>
+              </a:r>
+              <a:r>
+                <a:rPr lang="en-US" altLang="ko-KR" sz="1600" dirty="0" err="1">
+                  <a:solidFill>
+                    <a:schemeClr val="tx1">
+                      <a:lumMod val="75000"/>
+                      <a:lumOff val="25000"/>
+                    </a:schemeClr>
+                  </a:solidFill>
+                  <a:cs typeface="Arial" pitchFamily="34" charset="0"/>
+                </a:rPr>
+                <a:t>động</a:t>
+              </a:r>
+              <a:r>
+                <a:rPr lang="en-US" altLang="ko-KR" sz="1600" dirty="0">
+                  <a:solidFill>
+                    <a:schemeClr val="tx1">
+                      <a:lumMod val="75000"/>
+                      <a:lumOff val="25000"/>
+                    </a:schemeClr>
+                  </a:solidFill>
+                  <a:cs typeface="Arial" pitchFamily="34" charset="0"/>
+                </a:rPr>
+                <a:t> client-server</a:t>
+              </a:r>
+            </a:p>
+            <a:p>
+              <a:endParaRPr lang="en-US" altLang="ko-KR" sz="1600" dirty="0">
+                <a:solidFill>
+                  <a:schemeClr val="tx1">
+                    <a:lumMod val="75000"/>
+                    <a:lumOff val="25000"/>
+                  </a:schemeClr>
+                </a:solidFill>
+                <a:cs typeface="Arial" pitchFamily="34" charset="0"/>
+              </a:endParaRPr>
+            </a:p>
+          </p:txBody>
+        </p:sp>
+        <p:sp>
+          <p:nvSpPr>
+            <p:cNvPr id="20" name="TextBox 19"/>
+            <p:cNvSpPr txBox="1"/>
+            <p:nvPr/>
+          </p:nvSpPr>
+          <p:spPr>
+            <a:xfrm>
+              <a:off x="1446245" y="1607432"/>
+              <a:ext cx="3030085" cy="221118"/>
+            </a:xfrm>
+            <a:prstGeom prst="rect">
+              <a:avLst/>
+            </a:prstGeom>
+            <a:noFill/>
+          </p:spPr>
+          <p:txBody>
+            <a:bodyPr wrap="square" rtlCol="0" anchor="ctr">
+              <a:spAutoFit/>
+            </a:bodyPr>
+            <a:lstStyle/>
+            <a:p>
+              <a:r>
+                <a:rPr lang="en-US" altLang="ko-KR" sz="2000" b="1" dirty="0">
+                  <a:solidFill>
+                    <a:schemeClr val="accent2"/>
+                  </a:solidFill>
+                  <a:cs typeface="Arial" pitchFamily="34" charset="0"/>
+                </a:rPr>
+                <a:t>Multi-player</a:t>
+              </a:r>
+              <a:endParaRPr lang="ko-KR" altLang="en-US" sz="2000" b="1" dirty="0">
+                <a:solidFill>
+                  <a:schemeClr val="accent2"/>
+                </a:solidFill>
+                <a:cs typeface="Arial" pitchFamily="34" charset="0"/>
+              </a:endParaRPr>
+            </a:p>
+          </p:txBody>
+        </p:sp>
+      </p:grpSp>
+      <p:sp>
+        <p:nvSpPr>
+          <p:cNvPr id="22" name="TextBox 21"/>
+          <p:cNvSpPr txBox="1"/>
+          <p:nvPr/>
+        </p:nvSpPr>
+        <p:spPr>
+          <a:xfrm>
+            <a:off x="5710827" y="3672392"/>
+            <a:ext cx="2926615" cy="276999"/>
+          </a:xfrm>
+          <a:prstGeom prst="rect">
+            <a:avLst/>
+          </a:prstGeom>
+          <a:noFill/>
+        </p:spPr>
+        <p:txBody>
+          <a:bodyPr wrap="square" rtlCol="0" anchor="ctr">
+            <a:spAutoFit/>
+          </a:bodyPr>
+          <a:lstStyle/>
+          <a:p>
+            <a:endParaRPr lang="ko-KR" altLang="en-US" sz="1200" dirty="0">
+              <a:solidFill>
+                <a:schemeClr val="tx1">
+                  <a:lumMod val="75000"/>
+                  <a:lumOff val="25000"/>
+                </a:schemeClr>
+              </a:solidFill>
+              <a:cs typeface="Arial" pitchFamily="34" charset="0"/>
+            </a:endParaRPr>
+          </a:p>
+        </p:txBody>
+      </p:sp>
     </p:spTree>
     <p:extLst>
       <p:ext uri="{BB962C8B-B14F-4D97-AF65-F5344CB8AC3E}">
-        <p14:creationId xmlns:p14="http://schemas.microsoft.com/office/powerpoint/2010/main" val="2597575594"/>
+        <p14:creationId xmlns:p14="http://schemas.microsoft.com/office/powerpoint/2010/main" val="843571759"/>
       </p:ext>
     </p:extLst>
   </p:cSld>
@@ -10890,7 +11683,34 @@
                   </a:solidFill>
                   <a:cs typeface="Arial" pitchFamily="34" charset="0"/>
                 </a:rPr>
-                <a:t> DLC</a:t>
+                <a:t> </a:t>
+              </a:r>
+              <a:r>
+                <a:rPr lang="en-US" altLang="ko-KR" sz="1400" b="1" dirty="0" err="1">
+                  <a:solidFill>
+                    <a:schemeClr val="bg1"/>
+                  </a:solidFill>
+                  <a:cs typeface="Arial" pitchFamily="34" charset="0"/>
+                </a:rPr>
+                <a:t>trò</a:t>
+              </a:r>
+              <a:r>
+                <a:rPr lang="en-US" altLang="ko-KR" sz="1400" b="1" dirty="0">
+                  <a:solidFill>
+                    <a:schemeClr val="bg1"/>
+                  </a:solidFill>
+                  <a:cs typeface="Arial" pitchFamily="34" charset="0"/>
+                </a:rPr>
+                <a:t> </a:t>
+              </a:r>
+              <a:r>
+                <a:rPr lang="en-US" altLang="ko-KR" sz="1400" b="1" dirty="0" err="1">
+                  <a:solidFill>
+                    <a:schemeClr val="bg1"/>
+                  </a:solidFill>
+                  <a:cs typeface="Arial" pitchFamily="34" charset="0"/>
+                </a:rPr>
+                <a:t>chơi</a:t>
               </a:r>
               <a:endParaRPr lang="ko-KR" altLang="en-US" sz="1400" b="1" dirty="0">
                 <a:solidFill>
@@ -11432,7 +12252,67 @@
                   </a:solidFill>
                   <a:cs typeface="Arial" pitchFamily="34" charset="0"/>
                 </a:rPr>
-                <a:t> game</a:t>
+                <a:t> </a:t>
+              </a:r>
+              <a:r>
+                <a:rPr lang="en-US" altLang="ko-KR" sz="1400" b="1" dirty="0" err="1">
+                  <a:solidFill>
+                    <a:schemeClr val="tx1">
+                      <a:lumMod val="75000"/>
+                      <a:lumOff val="25000"/>
+                    </a:schemeClr>
+                  </a:solidFill>
+                  <a:cs typeface="Arial" pitchFamily="34" charset="0"/>
+                </a:rPr>
+                <a:t>hệ</a:t>
+              </a:r>
+              <a:r>
+                <a:rPr lang="en-US" altLang="ko-KR" sz="1400" b="1" dirty="0">
+                  <a:solidFill>
+                    <a:schemeClr val="tx1">
+                      <a:lumMod val="75000"/>
+                      <a:lumOff val="25000"/>
+                    </a:schemeClr>
+                  </a:solidFill>
+                  <a:cs typeface="Arial" pitchFamily="34" charset="0"/>
+                </a:rPr>
+                <a:t> </a:t>
+              </a:r>
+              <a:r>
+                <a:rPr lang="en-US" altLang="ko-KR" sz="1400" b="1" dirty="0" err="1">
+                  <a:solidFill>
+                    <a:schemeClr val="tx1">
+                      <a:lumMod val="75000"/>
+                      <a:lumOff val="25000"/>
+                    </a:schemeClr>
+                  </a:solidFill>
+                  <a:cs typeface="Arial" pitchFamily="34" charset="0"/>
+                </a:rPr>
+                <a:t>sinh</a:t>
+              </a:r>
+              <a:r>
+                <a:rPr lang="en-US" altLang="ko-KR" sz="1400" b="1" dirty="0">
+                  <a:solidFill>
+                    <a:schemeClr val="tx1">
+                      <a:lumMod val="75000"/>
+                      <a:lumOff val="25000"/>
+                    </a:schemeClr>
+                  </a:solidFill>
+                  <a:cs typeface="Arial" pitchFamily="34" charset="0"/>
+                </a:rPr>
+                <a:t> </a:t>
+              </a:r>
+              <a:r>
+                <a:rPr lang="en-US" altLang="ko-KR" sz="1400" b="1" dirty="0" err="1">
+                  <a:solidFill>
+                    <a:schemeClr val="tx1">
+                      <a:lumMod val="75000"/>
+                      <a:lumOff val="25000"/>
+                    </a:schemeClr>
+                  </a:solidFill>
+                  <a:cs typeface="Arial" pitchFamily="34" charset="0"/>
+                </a:rPr>
+                <a:t>thái</a:t>
               </a:r>
               <a:endParaRPr lang="ko-KR" altLang="en-US" sz="1400" b="1" dirty="0">
                 <a:solidFill>

</xml_diff>